<commit_message>
presentation pptx and pdf
</commit_message>
<xml_diff>
--- a/doc/presentation/presentation.pptx
+++ b/doc/presentation/presentation.pptx
@@ -4257,28 +4257,6 @@
       </p:grpSpPr>
       <p:sp>
         <p:nvSpPr>
-          <p:cNvPr id="4" name="Date Placeholder 3"/>
-          <p:cNvSpPr>
-            <a:spLocks noGrp="1"/>
-          </p:cNvSpPr>
-          <p:nvPr>
-            <p:ph type="dt" idx="10"/>
-          </p:nvPr>
-        </p:nvSpPr>
-        <p:spPr/>
-        <p:txBody>
-          <a:bodyPr/>
-          <a:lstStyle/>
-          <a:p>
-            <a:r>
-              <a:rPr lang="en-US"/>
-              <a:t>5/4/10</a:t>
-            </a:r>
-          </a:p>
-        </p:txBody>
-      </p:sp>
-      <p:sp>
-        <p:nvSpPr>
           <p:cNvPr id="13313" name="Rectangle 1"/>
           <p:cNvSpPr>
             <a:spLocks noGrp="1" noChangeArrowheads="1"/>
@@ -4314,164 +4292,10 @@
               </a:tabLst>
             </a:pPr>
             <a:r>
-              <a:rPr lang="en-US" sz="4400" dirty="0" smtClean="0"/>
+              <a:rPr lang="en-US" sz="4400" b="1" dirty="0" smtClean="0"/>
               <a:t>Initial Test Applications</a:t>
             </a:r>
-            <a:endParaRPr lang="en-US" sz="4400" dirty="0"/>
-          </a:p>
-        </p:txBody>
-      </p:sp>
-      <p:sp>
-        <p:nvSpPr>
-          <p:cNvPr id="13314" name="Text Box 2"/>
-          <p:cNvSpPr txBox="1">
-            <a:spLocks noChangeArrowheads="1"/>
-          </p:cNvSpPr>
-          <p:nvPr/>
-        </p:nvSpPr>
-        <p:spPr bwMode="auto">
-          <a:xfrm>
-            <a:off x="457200" y="1600200"/>
-            <a:ext cx="8229600" cy="4525963"/>
-          </a:xfrm>
-          <a:prstGeom prst="rect">
-            <a:avLst/>
-          </a:prstGeom>
-          <a:noFill/>
-          <a:ln w="9525">
-            <a:noFill/>
-            <a:round/>
-            <a:headEnd/>
-            <a:tailEnd/>
-          </a:ln>
-          <a:effectLst/>
-        </p:spPr>
-        <p:txBody>
-          <a:bodyPr lIns="90000" tIns="45000" rIns="90000" bIns="45000">
-            <a:prstTxWarp prst="textNoShape">
-              <a:avLst/>
-            </a:prstTxWarp>
-          </a:bodyPr>
-          <a:lstStyle/>
-          <a:p>
-            <a:pPr marL="342900" indent="-341313" hangingPunct="1">
-              <a:lnSpc>
-                <a:spcPct val="102000"/>
-              </a:lnSpc>
-              <a:spcBef>
-                <a:spcPts val="638"/>
-              </a:spcBef>
-              <a:spcAft>
-                <a:spcPts val="1425"/>
-              </a:spcAft>
-              <a:buSzPct val="45000"/>
-              <a:buFont typeface="Arial" pitchFamily="-106" charset="0"/>
-              <a:buChar char="•"/>
-              <a:tabLst>
-                <a:tab pos="723900" algn="l"/>
-                <a:tab pos="1447800" algn="l"/>
-                <a:tab pos="2171700" algn="l"/>
-                <a:tab pos="2895600" algn="l"/>
-                <a:tab pos="3619500" algn="l"/>
-                <a:tab pos="4343400" algn="l"/>
-                <a:tab pos="5067300" algn="l"/>
-                <a:tab pos="5791200" algn="l"/>
-                <a:tab pos="6515100" algn="l"/>
-                <a:tab pos="7239000" algn="l"/>
-                <a:tab pos="7962900" algn="l"/>
-              </a:tabLst>
-            </a:pPr>
-            <a:r>
-              <a:rPr lang="en-US" sz="3200" dirty="0">
-                <a:solidFill>
-                  <a:srgbClr val="000000"/>
-                </a:solidFill>
-                <a:latin typeface="Calibri" charset="0"/>
-                <a:ea typeface="MS Gothic" charset="0"/>
-                <a:cs typeface="MS Gothic" charset="0"/>
-              </a:rPr>
-              <a:t>Linked list</a:t>
-            </a:r>
-          </a:p>
-          <a:p>
-            <a:pPr marL="342900" indent="-341313" hangingPunct="1">
-              <a:lnSpc>
-                <a:spcPct val="102000"/>
-              </a:lnSpc>
-              <a:spcBef>
-                <a:spcPts val="638"/>
-              </a:spcBef>
-              <a:spcAft>
-                <a:spcPts val="1425"/>
-              </a:spcAft>
-              <a:buSzPct val="45000"/>
-              <a:buFont typeface="Arial" pitchFamily="-106" charset="0"/>
-              <a:buChar char="•"/>
-              <a:tabLst>
-                <a:tab pos="723900" algn="l"/>
-                <a:tab pos="1447800" algn="l"/>
-                <a:tab pos="2171700" algn="l"/>
-                <a:tab pos="2895600" algn="l"/>
-                <a:tab pos="3619500" algn="l"/>
-                <a:tab pos="4343400" algn="l"/>
-                <a:tab pos="5067300" algn="l"/>
-                <a:tab pos="5791200" algn="l"/>
-                <a:tab pos="6515100" algn="l"/>
-                <a:tab pos="7239000" algn="l"/>
-                <a:tab pos="7962900" algn="l"/>
-              </a:tabLst>
-            </a:pPr>
-            <a:r>
-              <a:rPr lang="en-US" sz="3200" dirty="0">
-                <a:solidFill>
-                  <a:srgbClr val="000000"/>
-                </a:solidFill>
-                <a:latin typeface="Calibri" charset="0"/>
-                <a:ea typeface="MS Gothic" charset="0"/>
-                <a:cs typeface="MS Gothic" charset="0"/>
-              </a:rPr>
-              <a:t>Locking service</a:t>
-            </a:r>
-          </a:p>
-          <a:p>
-            <a:pPr marL="342900" indent="-341313" hangingPunct="1">
-              <a:lnSpc>
-                <a:spcPct val="102000"/>
-              </a:lnSpc>
-              <a:spcBef>
-                <a:spcPts val="638"/>
-              </a:spcBef>
-              <a:spcAft>
-                <a:spcPts val="1425"/>
-              </a:spcAft>
-              <a:buSzPct val="45000"/>
-              <a:buFont typeface="Arial" pitchFamily="-106" charset="0"/>
-              <a:buChar char="•"/>
-              <a:tabLst>
-                <a:tab pos="723900" algn="l"/>
-                <a:tab pos="1447800" algn="l"/>
-                <a:tab pos="2171700" algn="l"/>
-                <a:tab pos="2895600" algn="l"/>
-                <a:tab pos="3619500" algn="l"/>
-                <a:tab pos="4343400" algn="l"/>
-                <a:tab pos="5067300" algn="l"/>
-                <a:tab pos="5791200" algn="l"/>
-                <a:tab pos="6515100" algn="l"/>
-                <a:tab pos="7239000" algn="l"/>
-                <a:tab pos="7962900" algn="l"/>
-              </a:tabLst>
-            </a:pPr>
-            <a:r>
-              <a:rPr lang="en-US" sz="3200" dirty="0">
-                <a:solidFill>
-                  <a:srgbClr val="000000"/>
-                </a:solidFill>
-                <a:latin typeface="Calibri" charset="0"/>
-                <a:ea typeface="MS Gothic" charset="0"/>
-                <a:cs typeface="MS Gothic" charset="0"/>
-              </a:rPr>
-              <a:t>Hash table</a:t>
-            </a:r>
+            <a:endParaRPr lang="en-US" sz="4400" b="1" dirty="0"/>
           </a:p>
         </p:txBody>
       </p:sp>
@@ -4494,11 +4318,65 @@
         </p:blipFill>
         <p:spPr>
           <a:xfrm>
-            <a:off x="2057400" y="2886648"/>
+            <a:off x="1587500" y="3077148"/>
             <a:ext cx="6629400" cy="3645915"/>
           </a:xfrm>
         </p:spPr>
       </p:pic>
+      <p:sp>
+        <p:nvSpPr>
+          <p:cNvPr id="6" name="TextBox 5"/>
+          <p:cNvSpPr txBox="1"/>
+          <p:nvPr/>
+        </p:nvSpPr>
+        <p:spPr>
+          <a:xfrm>
+            <a:off x="648781" y="1417638"/>
+            <a:ext cx="3783519" cy="1659510"/>
+          </a:xfrm>
+          <a:prstGeom prst="rect">
+            <a:avLst/>
+          </a:prstGeom>
+          <a:noFill/>
+        </p:spPr>
+        <p:txBody>
+          <a:bodyPr wrap="square" rtlCol="0">
+            <a:normAutofit/>
+          </a:bodyPr>
+          <a:lstStyle/>
+          <a:p>
+            <a:pPr>
+              <a:buFont typeface="Arial"/>
+              <a:buChar char="•"/>
+            </a:pPr>
+            <a:r>
+              <a:rPr lang="en-US" sz="3300" dirty="0" smtClean="0"/>
+              <a:t> Linked List</a:t>
+            </a:r>
+          </a:p>
+          <a:p>
+            <a:pPr>
+              <a:buFont typeface="Arial"/>
+              <a:buChar char="•"/>
+            </a:pPr>
+            <a:r>
+              <a:rPr lang="en-US" sz="3300" dirty="0" smtClean="0"/>
+              <a:t> Locking Service</a:t>
+            </a:r>
+          </a:p>
+          <a:p>
+            <a:pPr>
+              <a:buFont typeface="Arial"/>
+              <a:buChar char="•"/>
+            </a:pPr>
+            <a:r>
+              <a:rPr lang="en-US" sz="3300" dirty="0" smtClean="0"/>
+              <a:t> Hash table</a:t>
+            </a:r>
+            <a:endParaRPr lang="en-US" sz="3300" dirty="0"/>
+          </a:p>
+        </p:txBody>
+      </p:sp>
     </p:spTree>
   </p:cSld>
   <p:clrMapOvr>
@@ -4556,28 +4434,6 @@
       </p:grpSpPr>
       <p:sp>
         <p:nvSpPr>
-          <p:cNvPr id="23" name="Date Placeholder 3"/>
-          <p:cNvSpPr>
-            <a:spLocks noGrp="1"/>
-          </p:cNvSpPr>
-          <p:nvPr>
-            <p:ph type="dt" idx="10"/>
-          </p:nvPr>
-        </p:nvSpPr>
-        <p:spPr/>
-        <p:txBody>
-          <a:bodyPr/>
-          <a:lstStyle/>
-          <a:p>
-            <a:r>
-              <a:rPr lang="en-US" dirty="0"/>
-              <a:t>5/4/10</a:t>
-            </a:r>
-          </a:p>
-        </p:txBody>
-      </p:sp>
-      <p:sp>
-        <p:nvSpPr>
           <p:cNvPr id="10241" name="Rectangle 1"/>
           <p:cNvSpPr>
             <a:spLocks noGrp="1" noChangeArrowheads="1"/>
@@ -4615,19 +4471,19 @@
               </a:tabLst>
             </a:pPr>
             <a:r>
-              <a:rPr lang="en-US" sz="4400" dirty="0" smtClean="0"/>
+              <a:rPr lang="en-US" sz="4400" b="1" dirty="0" smtClean="0"/>
               <a:t>Active </a:t>
             </a:r>
             <a:r>
-              <a:rPr lang="en-US" sz="4400" dirty="0"/>
+              <a:rPr lang="en-US" sz="4400" b="1" dirty="0"/>
               <a:t>RDMA File </a:t>
             </a:r>
             <a:r>
-              <a:rPr lang="en-US" sz="4400" dirty="0" smtClean="0"/>
+              <a:rPr lang="en-US" sz="4400" b="1" dirty="0" smtClean="0"/>
               <a:t>System (</a:t>
             </a:r>
             <a:r>
-              <a:rPr lang="en-US" sz="4400" dirty="0"/>
+              <a:rPr lang="en-US" sz="4400" b="1" dirty="0"/>
               <a:t>ARFS)</a:t>
             </a:r>
           </a:p>
@@ -4680,7 +4536,7 @@
         </p:nvSpPr>
         <p:spPr bwMode="auto">
           <a:xfrm>
-            <a:off x="1487488" y="4800600"/>
+            <a:off x="1081088" y="4800600"/>
             <a:ext cx="6400800" cy="914400"/>
           </a:xfrm>
           <a:prstGeom prst="roundRect">
@@ -4723,7 +4579,7 @@
         </p:nvSpPr>
         <p:spPr bwMode="auto">
           <a:xfrm>
-            <a:off x="1500188" y="3951288"/>
+            <a:off x="1081088" y="3951288"/>
             <a:ext cx="1143000" cy="849312"/>
           </a:xfrm>
           <a:prstGeom prst="roundRect">
@@ -4787,7 +4643,7 @@
         </p:nvSpPr>
         <p:spPr bwMode="auto">
           <a:xfrm>
-            <a:off x="5487988" y="4800600"/>
+            <a:off x="5081588" y="4800600"/>
             <a:ext cx="1598612" cy="914400"/>
           </a:xfrm>
           <a:prstGeom prst="roundRect">
@@ -4835,7 +4691,7 @@
         </p:nvSpPr>
         <p:spPr bwMode="auto">
           <a:xfrm>
-            <a:off x="3886200" y="3429000"/>
+            <a:off x="3479800" y="3429000"/>
             <a:ext cx="3200400" cy="850900"/>
           </a:xfrm>
           <a:prstGeom prst="roundRect">
@@ -4872,6 +4728,26 @@
                 <a:tab pos="2895600" algn="l"/>
               </a:tabLst>
             </a:pPr>
+            <a:r>
+              <a:rPr lang="en-US" dirty="0" smtClean="0">
+                <a:solidFill>
+                  <a:srgbClr val="000000"/>
+                </a:solidFill>
+                <a:ea typeface="MS Gothic" charset="0"/>
+                <a:cs typeface="MS Gothic" charset="0"/>
+              </a:rPr>
+              <a:t>ARFS </a:t>
+            </a:r>
+            <a:r>
+              <a:rPr lang="en-US" dirty="0" smtClean="0">
+                <a:solidFill>
+                  <a:srgbClr val="000000"/>
+                </a:solidFill>
+                <a:ea typeface="MS Gothic" charset="0"/>
+                <a:cs typeface="MS Gothic" charset="0"/>
+              </a:rPr>
+              <a:t>Active Code</a:t>
+            </a:r>
             <a:endParaRPr lang="en-US" dirty="0">
               <a:solidFill>
                 <a:srgbClr val="000000"/>
@@ -4880,33 +4756,6 @@
               <a:cs typeface="MS Gothic" charset="0"/>
             </a:endParaRPr>
           </a:p>
-          <a:p>
-            <a:pPr algn="ctr">
-              <a:tabLst>
-                <a:tab pos="723900" algn="l"/>
-                <a:tab pos="1447800" algn="l"/>
-                <a:tab pos="2171700" algn="l"/>
-                <a:tab pos="2895600" algn="l"/>
-              </a:tabLst>
-            </a:pPr>
-            <a:r>
-              <a:rPr lang="en-US" dirty="0" smtClean="0">
-                <a:solidFill>
-                  <a:srgbClr val="000000"/>
-                </a:solidFill>
-                <a:ea typeface="MS Gothic" charset="0"/>
-                <a:cs typeface="MS Gothic" charset="0"/>
-              </a:rPr>
-              <a:t>ARFS Active Code</a:t>
-            </a:r>
-            <a:endParaRPr lang="en-US" dirty="0">
-              <a:solidFill>
-                <a:srgbClr val="000000"/>
-              </a:solidFill>
-              <a:ea typeface="MS Gothic" charset="0"/>
-              <a:cs typeface="MS Gothic" charset="0"/>
-            </a:endParaRPr>
-          </a:p>
         </p:txBody>
       </p:sp>
       <p:sp>
@@ -4919,20 +4768,23 @@
         </p:nvSpPr>
         <p:spPr bwMode="auto">
           <a:xfrm>
-            <a:off x="1371600" y="3200400"/>
-            <a:ext cx="6629400" cy="1588"/>
+            <a:off x="838200" y="3200400"/>
+            <a:ext cx="6787356" cy="0"/>
           </a:xfrm>
           <a:prstGeom prst="line">
             <a:avLst/>
           </a:prstGeom>
           <a:noFill/>
-          <a:ln w="9525">
+          <a:ln w="25400" cap="flat" cmpd="sng" algn="ctr">
             <a:solidFill>
-              <a:srgbClr val="008000"/>
+              <a:schemeClr val="bg2">
+                <a:lumMod val="25000"/>
+              </a:schemeClr>
             </a:solidFill>
+            <a:prstDash val="dash"/>
             <a:round/>
-            <a:headEnd/>
-            <a:tailEnd/>
+            <a:headEnd type="none" w="med" len="med"/>
+            <a:tailEnd type="none" w="med" len="med"/>
           </a:ln>
           <a:effectLst/>
         </p:spPr>
@@ -4958,7 +4810,7 @@
         </p:nvSpPr>
         <p:spPr bwMode="auto">
           <a:xfrm>
-            <a:off x="3570288" y="5715000"/>
+            <a:off x="3163888" y="5715000"/>
             <a:ext cx="1001712" cy="346075"/>
           </a:xfrm>
           <a:prstGeom prst="rect">
@@ -5009,7 +4861,7 @@
         </p:nvSpPr>
         <p:spPr bwMode="auto">
           <a:xfrm>
-            <a:off x="7543800" y="2397125"/>
+            <a:off x="7594600" y="2397125"/>
             <a:ext cx="763588" cy="346075"/>
           </a:xfrm>
           <a:prstGeom prst="rect">
@@ -5038,15 +4890,24 @@
               </a:tabLst>
             </a:pPr>
             <a:r>
-              <a:rPr lang="en-US">
+              <a:rPr lang="en-US" b="1" dirty="0" smtClean="0">
                 <a:solidFill>
                   <a:srgbClr val="000000"/>
                 </a:solidFill>
+                <a:latin typeface="Andale Mono"/>
                 <a:ea typeface="MS Gothic" charset="0"/>
-                <a:cs typeface="MS Gothic" charset="0"/>
+                <a:cs typeface="Andale Mono"/>
               </a:rPr>
-              <a:t>Client</a:t>
-            </a:r>
+              <a:t>CLIENT</a:t>
+            </a:r>
+            <a:endParaRPr lang="en-US" b="1" dirty="0">
+              <a:solidFill>
+                <a:srgbClr val="000000"/>
+              </a:solidFill>
+              <a:latin typeface="Andale Mono"/>
+              <a:ea typeface="MS Gothic" charset="0"/>
+              <a:cs typeface="Andale Mono"/>
+            </a:endParaRPr>
           </a:p>
         </p:txBody>
       </p:sp>
@@ -5060,7 +4921,7 @@
         </p:nvSpPr>
         <p:spPr bwMode="auto">
           <a:xfrm>
-            <a:off x="7605713" y="3997325"/>
+            <a:off x="7625556" y="4279900"/>
             <a:ext cx="852487" cy="803275"/>
           </a:xfrm>
           <a:prstGeom prst="rect">
@@ -5089,15 +4950,24 @@
               </a:tabLst>
             </a:pPr>
             <a:r>
-              <a:rPr lang="en-US">
+              <a:rPr lang="en-US" b="1" dirty="0" smtClean="0">
                 <a:solidFill>
                   <a:srgbClr val="000000"/>
                 </a:solidFill>
+                <a:latin typeface="Andale Mono"/>
                 <a:ea typeface="MS Gothic" charset="0"/>
-                <a:cs typeface="MS Gothic" charset="0"/>
+                <a:cs typeface="Andale Mono"/>
               </a:rPr>
-              <a:t>Server</a:t>
-            </a:r>
+              <a:t>SERVER</a:t>
+            </a:r>
+            <a:endParaRPr lang="en-US" b="1" dirty="0">
+              <a:solidFill>
+                <a:srgbClr val="000000"/>
+              </a:solidFill>
+              <a:latin typeface="Andale Mono"/>
+              <a:ea typeface="MS Gothic" charset="0"/>
+              <a:cs typeface="Andale Mono"/>
+            </a:endParaRPr>
           </a:p>
         </p:txBody>
       </p:sp>
@@ -5111,7 +4981,7 @@
         </p:nvSpPr>
         <p:spPr bwMode="auto">
           <a:xfrm>
-            <a:off x="3886200" y="2286000"/>
+            <a:off x="3479800" y="2286000"/>
             <a:ext cx="3200400" cy="685800"/>
           </a:xfrm>
           <a:prstGeom prst="roundRect">
@@ -5148,6 +5018,26 @@
                 <a:tab pos="2895600" algn="l"/>
               </a:tabLst>
             </a:pPr>
+            <a:r>
+              <a:rPr lang="en-US" dirty="0" smtClean="0">
+                <a:solidFill>
+                  <a:srgbClr val="000000"/>
+                </a:solidFill>
+                <a:ea typeface="MS Gothic" charset="0"/>
+                <a:cs typeface="MS Gothic" charset="0"/>
+              </a:rPr>
+              <a:t>ARFS </a:t>
+            </a:r>
+            <a:r>
+              <a:rPr lang="en-US" dirty="0" smtClean="0">
+                <a:solidFill>
+                  <a:srgbClr val="000000"/>
+                </a:solidFill>
+                <a:ea typeface="MS Gothic" charset="0"/>
+                <a:cs typeface="MS Gothic" charset="0"/>
+              </a:rPr>
+              <a:t>Client</a:t>
+            </a:r>
             <a:endParaRPr lang="en-US" dirty="0">
               <a:solidFill>
                 <a:srgbClr val="000000"/>
@@ -5156,33 +5046,6 @@
               <a:cs typeface="MS Gothic" charset="0"/>
             </a:endParaRPr>
           </a:p>
-          <a:p>
-            <a:pPr algn="ctr">
-              <a:tabLst>
-                <a:tab pos="723900" algn="l"/>
-                <a:tab pos="1447800" algn="l"/>
-                <a:tab pos="2171700" algn="l"/>
-                <a:tab pos="2895600" algn="l"/>
-              </a:tabLst>
-            </a:pPr>
-            <a:r>
-              <a:rPr lang="en-US" dirty="0" smtClean="0">
-                <a:solidFill>
-                  <a:srgbClr val="000000"/>
-                </a:solidFill>
-                <a:ea typeface="MS Gothic" charset="0"/>
-                <a:cs typeface="MS Gothic" charset="0"/>
-              </a:rPr>
-              <a:t>ARFS Client</a:t>
-            </a:r>
-            <a:endParaRPr lang="en-US" dirty="0">
-              <a:solidFill>
-                <a:srgbClr val="000000"/>
-              </a:solidFill>
-              <a:ea typeface="MS Gothic" charset="0"/>
-              <a:cs typeface="MS Gothic" charset="0"/>
-            </a:endParaRPr>
-          </a:p>
         </p:txBody>
       </p:sp>
       <p:sp>
@@ -5195,7 +5058,7 @@
         </p:nvSpPr>
         <p:spPr bwMode="auto">
           <a:xfrm>
-            <a:off x="5486400" y="2971800"/>
+            <a:off x="5080000" y="2971800"/>
             <a:ext cx="1588" cy="457200"/>
           </a:xfrm>
           <a:prstGeom prst="line">
@@ -5234,7 +5097,7 @@
         </p:nvSpPr>
         <p:spPr bwMode="auto">
           <a:xfrm flipV="1">
-            <a:off x="5715000" y="2970213"/>
+            <a:off x="5308600" y="2970213"/>
             <a:ext cx="1588" cy="460375"/>
           </a:xfrm>
           <a:prstGeom prst="line">
@@ -5273,7 +5136,7 @@
         </p:nvSpPr>
         <p:spPr bwMode="auto">
           <a:xfrm>
-            <a:off x="7445375" y="3184525"/>
+            <a:off x="7594600" y="2976562"/>
             <a:ext cx="1012825" cy="346075"/>
           </a:xfrm>
           <a:prstGeom prst="rect">
@@ -5302,15 +5165,24 @@
               </a:tabLst>
             </a:pPr>
             <a:r>
-              <a:rPr lang="en-US">
+              <a:rPr lang="en-US" b="1" dirty="0" smtClean="0">
                 <a:solidFill>
                   <a:srgbClr val="000000"/>
                 </a:solidFill>
+                <a:latin typeface="Andale Mono"/>
                 <a:ea typeface="MS Gothic" charset="0"/>
-                <a:cs typeface="MS Gothic" charset="0"/>
+                <a:cs typeface="Andale Mono"/>
               </a:rPr>
-              <a:t>Network</a:t>
-            </a:r>
+              <a:t>NETWORK</a:t>
+            </a:r>
+            <a:endParaRPr lang="en-US" b="1" dirty="0">
+              <a:solidFill>
+                <a:srgbClr val="000000"/>
+              </a:solidFill>
+              <a:latin typeface="Andale Mono"/>
+              <a:ea typeface="MS Gothic" charset="0"/>
+              <a:cs typeface="Andale Mono"/>
+            </a:endParaRPr>
           </a:p>
         </p:txBody>
       </p:sp>
@@ -5324,7 +5196,7 @@
         </p:nvSpPr>
         <p:spPr bwMode="auto">
           <a:xfrm flipH="1">
-            <a:off x="2630488" y="4089400"/>
+            <a:off x="2224088" y="4089400"/>
             <a:ext cx="1257300" cy="0"/>
           </a:xfrm>
           <a:prstGeom prst="line">
@@ -5363,7 +5235,7 @@
         </p:nvSpPr>
         <p:spPr bwMode="auto">
           <a:xfrm>
-            <a:off x="3886200" y="4800600"/>
+            <a:off x="3479800" y="4800600"/>
             <a:ext cx="1600200" cy="914400"/>
           </a:xfrm>
           <a:prstGeom prst="roundRect">
@@ -5392,9 +5264,6 @@
           </a:bodyPr>
           <a:lstStyle/>
           <a:p>
-            <a:endParaRPr lang="en-US" dirty="0" smtClean="0"/>
-          </a:p>
-          <a:p>
             <a:pPr algn="ctr"/>
             <a:r>
               <a:rPr lang="en-US" dirty="0" err="1" smtClean="0"/>
@@ -5414,7 +5283,7 @@
         </p:nvSpPr>
         <p:spPr bwMode="auto">
           <a:xfrm flipH="1">
-            <a:off x="1598613" y="5943600"/>
+            <a:off x="1192213" y="5943600"/>
             <a:ext cx="1831975" cy="1588"/>
           </a:xfrm>
           <a:prstGeom prst="line">
@@ -5453,7 +5322,7 @@
         </p:nvSpPr>
         <p:spPr bwMode="auto">
           <a:xfrm>
-            <a:off x="4572000" y="5943600"/>
+            <a:off x="4165600" y="5943600"/>
             <a:ext cx="3429000" cy="1588"/>
           </a:xfrm>
           <a:prstGeom prst="line">
@@ -5492,7 +5361,7 @@
         </p:nvSpPr>
         <p:spPr bwMode="auto">
           <a:xfrm>
-            <a:off x="3886200" y="4279900"/>
+            <a:off x="3479800" y="4279900"/>
             <a:ext cx="1601788" cy="520700"/>
           </a:xfrm>
           <a:prstGeom prst="roundRect">
@@ -5559,7 +5428,7 @@
         </p:nvSpPr>
         <p:spPr bwMode="auto">
           <a:xfrm>
-            <a:off x="5487988" y="4279900"/>
+            <a:off x="5081588" y="4279900"/>
             <a:ext cx="1598612" cy="520700"/>
           </a:xfrm>
           <a:prstGeom prst="roundRect">
@@ -5626,7 +5495,7 @@
         </p:nvSpPr>
         <p:spPr bwMode="auto">
           <a:xfrm flipH="1">
-            <a:off x="2643188" y="4495800"/>
+            <a:off x="2236788" y="4495800"/>
             <a:ext cx="1257300" cy="0"/>
           </a:xfrm>
           <a:prstGeom prst="line">
@@ -5712,28 +5581,6 @@
       </p:grpSpPr>
       <p:sp>
         <p:nvSpPr>
-          <p:cNvPr id="4" name="Date Placeholder 3"/>
-          <p:cNvSpPr>
-            <a:spLocks noGrp="1"/>
-          </p:cNvSpPr>
-          <p:nvPr>
-            <p:ph type="dt" idx="10"/>
-          </p:nvPr>
-        </p:nvSpPr>
-        <p:spPr/>
-        <p:txBody>
-          <a:bodyPr/>
-          <a:lstStyle/>
-          <a:p>
-            <a:r>
-              <a:rPr lang="en-US"/>
-              <a:t>5/4/10</a:t>
-            </a:r>
-          </a:p>
-        </p:txBody>
-      </p:sp>
-      <p:sp>
-        <p:nvSpPr>
           <p:cNvPr id="11265" name="Rectangle 1"/>
           <p:cNvSpPr>
             <a:spLocks noGrp="1" noChangeArrowheads="1"/>
@@ -5769,7 +5616,7 @@
               </a:tabLst>
             </a:pPr>
             <a:r>
-              <a:rPr lang="en-US" sz="4400"/>
+              <a:rPr lang="en-US" sz="4400" b="1" dirty="0"/>
               <a:t>ARFS Architecture</a:t>
             </a:r>
           </a:p>
@@ -5785,7 +5632,7 @@
         </p:nvSpPr>
         <p:spPr bwMode="auto">
           <a:xfrm>
-            <a:off x="457200" y="1600200"/>
+            <a:off x="457200" y="1308100"/>
             <a:ext cx="8229600" cy="4525963"/>
           </a:xfrm>
           <a:prstGeom prst="rect">
@@ -5809,9 +5656,6 @@
           <a:lstStyle/>
           <a:p>
             <a:pPr marL="342900" indent="-341313" hangingPunct="1">
-              <a:lnSpc>
-                <a:spcPct val="102000"/>
-              </a:lnSpc>
               <a:spcBef>
                 <a:spcPts val="638"/>
               </a:spcBef>
@@ -5819,8 +5663,6 @@
                 <a:spcPts val="1425"/>
               </a:spcAft>
               <a:buSzPct val="45000"/>
-              <a:buFont typeface="Arial" pitchFamily="-106" charset="0"/>
-              <a:buChar char="•"/>
               <a:tabLst>
                 <a:tab pos="723900" algn="l"/>
                 <a:tab pos="1447800" algn="l"/>
@@ -5836,6 +5678,17 @@
               </a:tabLst>
             </a:pPr>
             <a:r>
+              <a:rPr lang="en-US" sz="3200" dirty="0" smtClean="0">
+                <a:solidFill>
+                  <a:srgbClr val="000000"/>
+                </a:solidFill>
+                <a:latin typeface="Calibri" charset="0"/>
+                <a:ea typeface="MS Gothic" charset="0"/>
+                <a:cs typeface="MS Gothic" charset="0"/>
+              </a:rPr>
+              <a:t>Uses other </a:t>
+            </a:r>
+            <a:r>
               <a:rPr lang="en-US" sz="3200" dirty="0">
                 <a:solidFill>
                   <a:srgbClr val="000000"/>
@@ -5844,14 +5697,22 @@
                 <a:ea typeface="MS Gothic" charset="0"/>
                 <a:cs typeface="MS Gothic" charset="0"/>
               </a:rPr>
-              <a:t>Built on top of other Active code used as libraries.</a:t>
+              <a:t>Active code</a:t>
+            </a:r>
+            <a:r>
+              <a:rPr lang="en-US" sz="3200" dirty="0" smtClean="0">
+                <a:solidFill>
+                  <a:srgbClr val="000000"/>
+                </a:solidFill>
+                <a:latin typeface="Calibri" charset="0"/>
+                <a:ea typeface="MS Gothic" charset="0"/>
+                <a:cs typeface="MS Gothic" charset="0"/>
+              </a:rPr>
+              <a:t> as libraries:</a:t>
             </a:r>
           </a:p>
           <a:p>
             <a:pPr marL="863600" lvl="1" indent="-323850" hangingPunct="1">
-              <a:lnSpc>
-                <a:spcPct val="102000"/>
-              </a:lnSpc>
               <a:spcAft>
                 <a:spcPts val="1138"/>
               </a:spcAft>
@@ -5897,9 +5758,6 @@
           </a:p>
           <a:p>
             <a:pPr marL="863600" lvl="1" indent="-323850" hangingPunct="1">
-              <a:lnSpc>
-                <a:spcPct val="102000"/>
-              </a:lnSpc>
               <a:spcAft>
                 <a:spcPts val="1138"/>
               </a:spcAft>
@@ -5940,7 +5798,7 @@
                 <a:ea typeface="MS Gothic" charset="0"/>
                 <a:cs typeface="MS Gothic" charset="0"/>
               </a:rPr>
-              <a:t> Key </a:t>
+              <a:t> Path </a:t>
             </a:r>
             <a:r>
               <a:rPr lang="en-US" sz="3200" dirty="0" err="1" smtClean="0">
@@ -5980,9 +5838,6 @@
           </a:p>
           <a:p>
             <a:pPr marL="863600" lvl="1" indent="-323850" hangingPunct="1">
-              <a:lnSpc>
-                <a:spcPct val="102000"/>
-              </a:lnSpc>
               <a:spcAft>
                 <a:spcPts val="1138"/>
               </a:spcAft>
@@ -6023,7 +5878,18 @@
                 <a:ea typeface="MS Gothic" charset="0"/>
                 <a:cs typeface="MS Gothic" charset="0"/>
               </a:rPr>
-              <a:t> store : Address </a:t>
+              <a:t> store : Address</a:t>
+            </a:r>
+            <a:r>
+              <a:rPr lang="en-US" sz="3200" dirty="0" smtClean="0">
+                <a:solidFill>
+                  <a:srgbClr val="000000"/>
+                </a:solidFill>
+                <a:latin typeface="Calibri" charset="0"/>
+                <a:ea typeface="MS Gothic" charset="0"/>
+                <a:cs typeface="MS Gothic" charset="0"/>
+              </a:rPr>
+              <a:t> </a:t>
             </a:r>
             <a:r>
               <a:rPr lang="en-US" sz="3200" dirty="0" err="1" smtClean="0">
@@ -6047,7 +5913,19 @@
                 <a:cs typeface="MS Gothic" charset="0"/>
                 <a:sym typeface="Wingdings"/>
               </a:rPr>
-              <a:t> Data blocks</a:t>
+              <a:t> </a:t>
+            </a:r>
+            <a:r>
+              <a:rPr lang="en-US" sz="3200" dirty="0" smtClean="0">
+                <a:solidFill>
+                  <a:srgbClr val="000000"/>
+                </a:solidFill>
+                <a:latin typeface="Calibri" charset="0"/>
+                <a:ea typeface="MS Gothic" charset="0"/>
+                <a:cs typeface="MS Gothic" charset="0"/>
+                <a:sym typeface="Wingdings"/>
+              </a:rPr>
+              <a:t>Data blocks</a:t>
             </a:r>
             <a:endParaRPr lang="en-US" sz="3200" dirty="0" smtClean="0">
               <a:solidFill>
@@ -6060,9 +5938,6 @@
           </a:p>
           <a:p>
             <a:pPr marL="863600" lvl="1" indent="-323850" hangingPunct="1">
-              <a:lnSpc>
-                <a:spcPct val="102000"/>
-              </a:lnSpc>
               <a:spcAft>
                 <a:spcPts val="1138"/>
               </a:spcAft>
@@ -6103,66 +5978,15 @@
                 <a:ea typeface="MS Gothic" charset="0"/>
                 <a:cs typeface="MS Gothic" charset="0"/>
               </a:rPr>
-              <a:t> Hash table + </a:t>
-            </a:r>
-            <a:r>
-              <a:rPr lang="en-US" sz="3200" dirty="0" err="1" smtClean="0">
-                <a:solidFill>
-                  <a:srgbClr val="000000"/>
-                </a:solidFill>
-                <a:latin typeface="Calibri" charset="0"/>
-                <a:ea typeface="MS Gothic" charset="0"/>
-                <a:cs typeface="MS Gothic" charset="0"/>
-              </a:rPr>
-              <a:t>Inode</a:t>
-            </a:r>
-            <a:r>
-              <a:rPr lang="en-US" sz="3200" dirty="0" smtClean="0">
-                <a:solidFill>
-                  <a:srgbClr val="000000"/>
-                </a:solidFill>
-                <a:latin typeface="Calibri" charset="0"/>
-                <a:ea typeface="MS Gothic" charset="0"/>
-                <a:cs typeface="MS Gothic" charset="0"/>
-              </a:rPr>
-              <a:t> store </a:t>
-            </a:r>
-            <a:r>
-              <a:rPr lang="en-US" sz="3200" dirty="0" err="1" smtClean="0">
-                <a:solidFill>
-                  <a:srgbClr val="000000"/>
-                </a:solidFill>
-                <a:latin typeface="Calibri" charset="0"/>
-                <a:ea typeface="MS Gothic" charset="0"/>
-                <a:cs typeface="MS Gothic" charset="0"/>
-                <a:sym typeface="Wingdings"/>
-              </a:rPr>
-              <a:t></a:t>
-            </a:r>
-            <a:r>
-              <a:rPr lang="en-US" sz="3200" dirty="0" smtClean="0">
-                <a:solidFill>
-                  <a:srgbClr val="000000"/>
-                </a:solidFill>
-                <a:latin typeface="Calibri" charset="0"/>
-                <a:ea typeface="MS Gothic" charset="0"/>
-                <a:cs typeface="MS Gothic" charset="0"/>
-                <a:sym typeface="Wingdings"/>
-              </a:rPr>
-              <a:t> hierarchical data store</a:t>
+              <a:t> </a:t>
             </a:r>
           </a:p>
           <a:p>
             <a:pPr marL="1320800" lvl="2" indent="-323850">
-              <a:lnSpc>
-                <a:spcPct val="102000"/>
-              </a:lnSpc>
               <a:spcAft>
                 <a:spcPts val="1138"/>
               </a:spcAft>
               <a:buSzPct val="45000"/>
-              <a:buFont typeface="Wingdings" pitchFamily="-106" charset="2"/>
-              <a:buChar char=""/>
               <a:tabLst>
                 <a:tab pos="723900" algn="l"/>
                 <a:tab pos="1447800" algn="l"/>
@@ -6185,22 +6009,49 @@
                 <a:latin typeface="Calibri" charset="0"/>
                 <a:ea typeface="MS Gothic" charset="0"/>
                 <a:cs typeface="MS Gothic" charset="0"/>
-                <a:sym typeface="Wingdings"/>
               </a:rPr>
-              <a:t>HT key is full path</a:t>
+              <a:t>Hash table + </a:t>
+            </a:r>
+            <a:r>
+              <a:rPr lang="en-US" sz="3200" dirty="0" err="1" smtClean="0">
+                <a:solidFill>
+                  <a:srgbClr val="000000"/>
+                </a:solidFill>
+                <a:latin typeface="Calibri" charset="0"/>
+                <a:ea typeface="MS Gothic" charset="0"/>
+                <a:cs typeface="MS Gothic" charset="0"/>
+              </a:rPr>
+              <a:t>Inode</a:t>
+            </a:r>
+            <a:r>
+              <a:rPr lang="en-US" sz="3200" dirty="0" smtClean="0">
+                <a:solidFill>
+                  <a:srgbClr val="000000"/>
+                </a:solidFill>
+                <a:latin typeface="Calibri" charset="0"/>
+                <a:ea typeface="MS Gothic" charset="0"/>
+                <a:cs typeface="MS Gothic" charset="0"/>
+              </a:rPr>
+              <a:t> store</a:t>
+            </a:r>
+            <a:r>
+              <a:rPr lang="en-US" sz="3200" dirty="0" smtClean="0">
+                <a:solidFill>
+                  <a:srgbClr val="000000"/>
+                </a:solidFill>
+                <a:latin typeface="Calibri" charset="0"/>
+                <a:ea typeface="MS Gothic" charset="0"/>
+                <a:cs typeface="MS Gothic" charset="0"/>
+              </a:rPr>
+              <a:t> </a:t>
             </a:r>
           </a:p>
           <a:p>
             <a:pPr marL="1320800" lvl="2" indent="-323850">
-              <a:lnSpc>
-                <a:spcPct val="102000"/>
-              </a:lnSpc>
               <a:spcAft>
                 <a:spcPts val="1138"/>
               </a:spcAft>
               <a:buSzPct val="45000"/>
-              <a:buFont typeface="Wingdings" pitchFamily="-106" charset="2"/>
-              <a:buChar char=""/>
               <a:tabLst>
                 <a:tab pos="723900" algn="l"/>
                 <a:tab pos="1447800" algn="l"/>
@@ -6225,7 +6076,55 @@
                 <a:cs typeface="MS Gothic" charset="0"/>
                 <a:sym typeface="Wingdings"/>
               </a:rPr>
-              <a:t>Directories implemented as files</a:t>
+              <a:t>			</a:t>
+            </a:r>
+            <a:r>
+              <a:rPr lang="en-US" sz="3200" dirty="0" err="1" smtClean="0">
+                <a:solidFill>
+                  <a:srgbClr val="000000"/>
+                </a:solidFill>
+                <a:latin typeface="Calibri" charset="0"/>
+                <a:ea typeface="MS Gothic" charset="0"/>
+                <a:cs typeface="MS Gothic" charset="0"/>
+                <a:sym typeface="Wingdings"/>
+              </a:rPr>
+              <a:t></a:t>
+            </a:r>
+            <a:r>
+              <a:rPr lang="en-US" sz="3200" dirty="0" smtClean="0">
+                <a:solidFill>
+                  <a:srgbClr val="000000"/>
+                </a:solidFill>
+                <a:latin typeface="Calibri" charset="0"/>
+                <a:ea typeface="MS Gothic" charset="0"/>
+                <a:cs typeface="MS Gothic" charset="0"/>
+                <a:sym typeface="Wingdings"/>
+              </a:rPr>
+              <a:t> </a:t>
+            </a:r>
+            <a:r>
+              <a:rPr lang="en-US" sz="3200" dirty="0" smtClean="0">
+                <a:solidFill>
+                  <a:srgbClr val="000000"/>
+                </a:solidFill>
+                <a:latin typeface="Calibri" charset="0"/>
+                <a:ea typeface="MS Gothic" charset="0"/>
+                <a:cs typeface="MS Gothic" charset="0"/>
+                <a:sym typeface="Wingdings"/>
+              </a:rPr>
+              <a:t>hierarchical data </a:t>
+            </a:r>
+            <a:r>
+              <a:rPr lang="en-US" sz="3200" dirty="0" smtClean="0">
+                <a:solidFill>
+                  <a:srgbClr val="000000"/>
+                </a:solidFill>
+                <a:latin typeface="Calibri" charset="0"/>
+                <a:ea typeface="MS Gothic" charset="0"/>
+                <a:cs typeface="MS Gothic" charset="0"/>
+                <a:sym typeface="Wingdings"/>
+              </a:rPr>
+              <a:t>store</a:t>
             </a:r>
             <a:endParaRPr lang="en-US" sz="3200" dirty="0">
               <a:solidFill>
@@ -6309,10 +6208,10 @@
           <a:lstStyle/>
           <a:p>
             <a:r>
-              <a:rPr lang="en-US" dirty="0" smtClean="0"/>
+              <a:rPr lang="en-US" b="1" dirty="0" smtClean="0"/>
               <a:t>Evaluation Methodology</a:t>
             </a:r>
-            <a:endParaRPr lang="en-US" dirty="0"/>
+            <a:endParaRPr lang="en-US" b="1" dirty="0"/>
           </a:p>
         </p:txBody>
       </p:sp>
@@ -6326,7 +6225,12 @@
             <p:ph idx="1"/>
           </p:nvPr>
         </p:nvSpPr>
-        <p:spPr/>
+        <p:spPr>
+          <a:xfrm>
+            <a:off x="457200" y="1600200"/>
+            <a:ext cx="8229600" cy="5041900"/>
+          </a:xfrm>
+        </p:spPr>
         <p:txBody>
           <a:bodyPr>
             <a:normAutofit/>
@@ -6355,15 +6259,44 @@
           <a:p>
             <a:r>
               <a:rPr lang="en-US" dirty="0" smtClean="0"/>
-              <a:t>Tests: </a:t>
+              <a:t>Tests:</a:t>
             </a:r>
             <a:r>
               <a:rPr lang="en-US" dirty="0" smtClean="0"/>
-              <a:t>Andrew Benchmark, </a:t>
-            </a:r>
+              <a:t> </a:t>
+            </a:r>
+          </a:p>
+          <a:p>
+            <a:pPr lvl="1"/>
             <a:r>
               <a:rPr lang="en-US" dirty="0" smtClean="0"/>
-              <a:t>Stream-Read, Stream-Write</a:t>
+              <a:t>Andrew Benchmark</a:t>
+            </a:r>
+          </a:p>
+          <a:p>
+            <a:pPr lvl="1"/>
+            <a:r>
+              <a:rPr lang="en-US" dirty="0" smtClean="0"/>
+              <a:t>Stream</a:t>
+            </a:r>
+            <a:r>
+              <a:rPr lang="en-US" dirty="0" smtClean="0"/>
+              <a:t>-</a:t>
+            </a:r>
+            <a:r>
+              <a:rPr lang="en-US" dirty="0" smtClean="0"/>
+              <a:t>Read</a:t>
+            </a:r>
+          </a:p>
+          <a:p>
+            <a:pPr lvl="1"/>
+            <a:r>
+              <a:rPr lang="en-US" dirty="0" smtClean="0"/>
+              <a:t>Stream</a:t>
+            </a:r>
+            <a:r>
+              <a:rPr lang="en-US" dirty="0" smtClean="0"/>
+              <a:t>-Write</a:t>
             </a:r>
           </a:p>
           <a:p>
@@ -6377,7 +6310,37 @@
             </a:r>
             <a:r>
               <a:rPr lang="en-US" dirty="0" smtClean="0"/>
-              <a:t>: system utilities and active versions</a:t>
+              <a:t>:</a:t>
+            </a:r>
+            <a:r>
+              <a:rPr lang="en-US" dirty="0" smtClean="0"/>
+              <a:t> </a:t>
+            </a:r>
+          </a:p>
+          <a:p>
+            <a:pPr lvl="1"/>
+            <a:r>
+              <a:rPr lang="en-US" dirty="0" smtClean="0"/>
+              <a:t>system </a:t>
+            </a:r>
+            <a:r>
+              <a:rPr lang="en-US" dirty="0" smtClean="0"/>
+              <a:t>utilities</a:t>
+            </a:r>
+            <a:r>
+              <a:rPr lang="en-US" dirty="0" smtClean="0"/>
+              <a:t> </a:t>
+            </a:r>
+          </a:p>
+          <a:p>
+            <a:pPr lvl="1"/>
+            <a:r>
+              <a:rPr lang="en-US" dirty="0" smtClean="0"/>
+              <a:t>active </a:t>
+            </a:r>
+            <a:r>
+              <a:rPr lang="en-US" dirty="0" smtClean="0"/>
+              <a:t>versions</a:t>
             </a:r>
           </a:p>
           <a:p>
@@ -6436,10 +6399,10 @@
           <a:lstStyle/>
           <a:p>
             <a:r>
-              <a:rPr lang="en-US" dirty="0" smtClean="0"/>
+              <a:rPr lang="en-US" b="1" dirty="0" smtClean="0"/>
               <a:t>Simulation</a:t>
             </a:r>
-            <a:endParaRPr lang="en-US" dirty="0"/>
+            <a:endParaRPr lang="en-US" b="1" dirty="0"/>
           </a:p>
         </p:txBody>
       </p:sp>
@@ -6466,11 +6429,7 @@
             </a:r>
             <a:r>
               <a:rPr lang="en-US" dirty="0" smtClean="0"/>
-              <a:t> full-system </a:t>
-            </a:r>
-            <a:r>
-              <a:rPr lang="en-US" dirty="0" smtClean="0"/>
-              <a:t>simulator</a:t>
+              <a:t> full-system simulator</a:t>
             </a:r>
           </a:p>
           <a:p>
@@ -6605,10 +6564,10 @@
           <a:lstStyle/>
           <a:p>
             <a:r>
-              <a:rPr lang="en-US" dirty="0" smtClean="0"/>
+              <a:rPr lang="en-US" b="1" dirty="0" smtClean="0"/>
               <a:t>Basic Benchmarks</a:t>
             </a:r>
-            <a:endParaRPr lang="en-US" dirty="0"/>
+            <a:endParaRPr lang="en-US" b="1" dirty="0"/>
           </a:p>
         </p:txBody>
       </p:sp>
@@ -6687,14 +6646,14 @@
           <a:lstStyle/>
           <a:p>
             <a:r>
-              <a:rPr lang="en-US" dirty="0" smtClean="0"/>
+              <a:rPr lang="en-US" b="1" dirty="0" smtClean="0"/>
               <a:t>Find and </a:t>
             </a:r>
             <a:r>
-              <a:rPr lang="en-US" dirty="0" err="1" smtClean="0"/>
+              <a:rPr lang="en-US" b="1" dirty="0" err="1" smtClean="0"/>
               <a:t>Grep</a:t>
             </a:r>
-            <a:endParaRPr lang="en-US" dirty="0"/>
+            <a:endParaRPr lang="en-US" b="1" dirty="0"/>
           </a:p>
         </p:txBody>
       </p:sp>
@@ -6773,10 +6732,10 @@
           <a:lstStyle/>
           <a:p>
             <a:r>
-              <a:rPr lang="en-US" dirty="0" smtClean="0"/>
+              <a:rPr lang="en-US" b="1" dirty="0" smtClean="0"/>
               <a:t>CPU Load Scaling Behavior</a:t>
             </a:r>
-            <a:endParaRPr lang="en-US" dirty="0"/>
+            <a:endParaRPr lang="en-US" b="1" dirty="0"/>
           </a:p>
         </p:txBody>
       </p:sp>
@@ -6855,10 +6814,10 @@
           <a:lstStyle/>
           <a:p>
             <a:r>
-              <a:rPr lang="en-US" dirty="0" smtClean="0"/>
+              <a:rPr lang="en-US" b="1" dirty="0" smtClean="0"/>
               <a:t>Packet Roundtrips</a:t>
             </a:r>
-            <a:endParaRPr lang="en-US" dirty="0"/>
+            <a:endParaRPr lang="en-US" b="1" dirty="0"/>
           </a:p>
         </p:txBody>
       </p:sp>
@@ -6939,21 +6898,17 @@
           <a:lstStyle/>
           <a:p>
             <a:r>
-              <a:rPr lang="en-US" dirty="0" smtClean="0"/>
+              <a:rPr lang="en-US" b="1" dirty="0" smtClean="0"/>
               <a:t>Synthetic Runtime: </a:t>
             </a:r>
             <a:br>
-              <a:rPr lang="en-US" dirty="0" smtClean="0"/>
+              <a:rPr lang="en-US" b="1" dirty="0" smtClean="0"/>
             </a:br>
             <a:r>
-              <a:rPr lang="en-US" dirty="0" smtClean="0"/>
-              <a:t>RDMA vs. </a:t>
-            </a:r>
-            <a:r>
-              <a:rPr lang="en-US" dirty="0" smtClean="0"/>
-              <a:t>Active</a:t>
-            </a:r>
-            <a:endParaRPr lang="en-US" dirty="0"/>
+              <a:rPr lang="en-US" b="1" dirty="0" smtClean="0"/>
+              <a:t>RDMA vs. Active</a:t>
+            </a:r>
+            <a:endParaRPr lang="en-US" b="1" dirty="0"/>
           </a:p>
         </p:txBody>
       </p:sp>
@@ -7179,10 +7134,10 @@
           <a:lstStyle/>
           <a:p>
             <a:r>
-              <a:rPr lang="en-US" dirty="0" smtClean="0"/>
+              <a:rPr lang="en-US" b="1" dirty="0" smtClean="0"/>
               <a:t>Future Work</a:t>
             </a:r>
-            <a:endParaRPr lang="en-US" dirty="0"/>
+            <a:endParaRPr lang="en-US" b="1" dirty="0"/>
           </a:p>
         </p:txBody>
       </p:sp>
@@ -7314,10 +7269,10 @@
           <a:lstStyle/>
           <a:p>
             <a:r>
-              <a:rPr lang="en-US" dirty="0" smtClean="0"/>
+              <a:rPr lang="en-US" b="1" dirty="0" smtClean="0"/>
               <a:t>Future Work II</a:t>
             </a:r>
-            <a:endParaRPr lang="en-US" dirty="0"/>
+            <a:endParaRPr lang="en-US" b="1" dirty="0"/>
           </a:p>
         </p:txBody>
       </p:sp>
@@ -7366,11 +7321,7 @@
           <a:p>
             <a:r>
               <a:rPr lang="en-US" dirty="0" smtClean="0"/>
-              <a:t>Dynamic active </a:t>
-            </a:r>
-            <a:r>
-              <a:rPr lang="en-US" dirty="0" smtClean="0"/>
-              <a:t>code generation</a:t>
+              <a:t>Dynamic active code generation</a:t>
             </a:r>
           </a:p>
           <a:p>
@@ -7389,11 +7340,7 @@
             </a:r>
             <a:r>
               <a:rPr lang="en-US" dirty="0" smtClean="0"/>
-              <a:t> compiler</a:t>
-            </a:r>
-            <a:r>
-              <a:rPr lang="en-US" dirty="0" smtClean="0"/>
-              <a:t>? (after basic optimizations)</a:t>
+              <a:t> compiler? (after basic optimizations)</a:t>
             </a:r>
           </a:p>
           <a:p>
@@ -7459,10 +7406,10 @@
           <a:lstStyle/>
           <a:p>
             <a:r>
-              <a:rPr lang="en-US" dirty="0" smtClean="0"/>
+              <a:rPr lang="en-US" b="1" dirty="0" smtClean="0"/>
               <a:t>Summary &amp; Conclusion</a:t>
             </a:r>
-            <a:endParaRPr lang="en-US" dirty="0"/>
+            <a:endParaRPr lang="en-US" b="1" dirty="0"/>
           </a:p>
         </p:txBody>
       </p:sp>
@@ -7491,11 +7438,7 @@
           <a:p>
             <a:r>
               <a:rPr lang="en-US" dirty="0" smtClean="0"/>
-              <a:t>Built </a:t>
-            </a:r>
-            <a:r>
-              <a:rPr lang="en-US" dirty="0" smtClean="0"/>
-              <a:t>proof-of-concept in-memory network </a:t>
+              <a:t>Built proof-of-concept in-memory network </a:t>
             </a:r>
             <a:r>
               <a:rPr lang="en-US" dirty="0" err="1" smtClean="0"/>
@@ -7506,21 +7449,13 @@
           <a:p>
             <a:r>
               <a:rPr lang="en-US" dirty="0" smtClean="0"/>
-              <a:t>Evaluated </a:t>
-            </a:r>
+              <a:t>Evaluated performance in simulation</a:t>
+            </a:r>
+          </a:p>
+          <a:p>
             <a:r>
               <a:rPr lang="en-US" dirty="0" smtClean="0"/>
-              <a:t>performance in simulation</a:t>
-            </a:r>
-          </a:p>
-          <a:p>
-            <a:r>
-              <a:rPr lang="en-US" dirty="0" smtClean="0"/>
-              <a:t>Showed a few active code-specific </a:t>
-            </a:r>
-            <a:r>
-              <a:rPr lang="en-US" dirty="0" smtClean="0"/>
-              <a:t>applications</a:t>
+              <a:t>Showed a few active code-specific applications</a:t>
             </a:r>
           </a:p>
           <a:p>
@@ -7561,11 +7496,7 @@
           <a:p>
             <a:r>
               <a:rPr lang="en-US" dirty="0" smtClean="0"/>
-              <a:t>Underwhelming </a:t>
-            </a:r>
-            <a:r>
-              <a:rPr lang="en-US" dirty="0" smtClean="0"/>
-              <a:t>prototype performance, but interesting possibilities for future</a:t>
+              <a:t>Underwhelming prototype performance, but interesting possibilities for future</a:t>
             </a:r>
             <a:endParaRPr lang="en-US" dirty="0"/>
           </a:p>
@@ -7718,8 +7649,8 @@
           </a:prstGeom>
           <a:solidFill>
             <a:schemeClr val="accent4">
-              <a:lumMod val="20000"/>
-              <a:lumOff val="80000"/>
+              <a:lumMod val="60000"/>
+              <a:lumOff val="40000"/>
             </a:schemeClr>
           </a:solidFill>
         </p:spPr>
@@ -7762,8 +7693,8 @@
           </a:prstGeom>
           <a:solidFill>
             <a:schemeClr val="accent4">
-              <a:lumMod val="20000"/>
-              <a:lumOff val="80000"/>
+              <a:lumMod val="60000"/>
+              <a:lumOff val="40000"/>
             </a:schemeClr>
           </a:solidFill>
         </p:spPr>
@@ -8269,28 +8200,11 @@
           <a:prstGeom prst="ellipse">
             <a:avLst/>
           </a:prstGeom>
-          <a:gradFill flip="none" rotWithShape="1">
-            <a:gsLst>
-              <a:gs pos="0">
-                <a:schemeClr val="accent1">
-                  <a:tint val="100000"/>
-                  <a:shade val="100000"/>
-                  <a:satMod val="130000"/>
-                  <a:alpha val="10000"/>
-                </a:schemeClr>
-              </a:gs>
-              <a:gs pos="100000">
-                <a:schemeClr val="accent1">
-                  <a:tint val="50000"/>
-                  <a:shade val="100000"/>
-                  <a:satMod val="350000"/>
-                  <a:alpha val="10000"/>
-                </a:schemeClr>
-              </a:gs>
-            </a:gsLst>
-            <a:lin ang="16200000" scaled="0"/>
-            <a:tileRect/>
-          </a:gradFill>
+          <a:solidFill>
+            <a:schemeClr val="bg1">
+              <a:lumMod val="75000"/>
+            </a:schemeClr>
+          </a:solidFill>
           <a:ln>
             <a:noFill/>
           </a:ln>
@@ -9394,6 +9308,52 @@
       </p:grpSpPr>
       <p:sp>
         <p:nvSpPr>
+          <p:cNvPr id="45" name="Oval 44"/>
+          <p:cNvSpPr/>
+          <p:nvPr/>
+        </p:nvSpPr>
+        <p:spPr>
+          <a:xfrm>
+            <a:off x="4086719" y="1420841"/>
+            <a:ext cx="1052548" cy="436560"/>
+          </a:xfrm>
+          <a:prstGeom prst="ellipse">
+            <a:avLst/>
+          </a:prstGeom>
+          <a:solidFill>
+            <a:schemeClr val="bg1">
+              <a:lumMod val="65000"/>
+            </a:schemeClr>
+          </a:solidFill>
+          <a:ln>
+            <a:noFill/>
+          </a:ln>
+        </p:spPr>
+        <p:style>
+          <a:lnRef idx="1">
+            <a:schemeClr val="accent1"/>
+          </a:lnRef>
+          <a:fillRef idx="3">
+            <a:schemeClr val="accent1"/>
+          </a:fillRef>
+          <a:effectRef idx="2">
+            <a:schemeClr val="accent1"/>
+          </a:effectRef>
+          <a:fontRef idx="minor">
+            <a:schemeClr val="lt1"/>
+          </a:fontRef>
+        </p:style>
+        <p:txBody>
+          <a:bodyPr rtlCol="0" anchor="ctr"/>
+          <a:lstStyle/>
+          <a:p>
+            <a:pPr algn="ctr"/>
+            <a:endParaRPr lang="en-US" sz="1700" dirty="0"/>
+          </a:p>
+        </p:txBody>
+      </p:sp>
+      <p:sp>
+        <p:nvSpPr>
           <p:cNvPr id="2" name="Title 1"/>
           <p:cNvSpPr>
             <a:spLocks noGrp="1"/>
@@ -9923,69 +9883,6 @@
       </p:sp>
       <p:sp>
         <p:nvSpPr>
-          <p:cNvPr id="45" name="Oval 44"/>
-          <p:cNvSpPr/>
-          <p:nvPr/>
-        </p:nvSpPr>
-        <p:spPr>
-          <a:xfrm>
-            <a:off x="4086719" y="1420841"/>
-            <a:ext cx="1052548" cy="436560"/>
-          </a:xfrm>
-          <a:prstGeom prst="ellipse">
-            <a:avLst/>
-          </a:prstGeom>
-          <a:gradFill flip="none" rotWithShape="1">
-            <a:gsLst>
-              <a:gs pos="0">
-                <a:schemeClr val="accent1">
-                  <a:tint val="100000"/>
-                  <a:shade val="100000"/>
-                  <a:satMod val="130000"/>
-                  <a:alpha val="10000"/>
-                </a:schemeClr>
-              </a:gs>
-              <a:gs pos="100000">
-                <a:schemeClr val="accent1">
-                  <a:tint val="50000"/>
-                  <a:shade val="100000"/>
-                  <a:satMod val="350000"/>
-                  <a:alpha val="10000"/>
-                </a:schemeClr>
-              </a:gs>
-            </a:gsLst>
-            <a:lin ang="16200000" scaled="0"/>
-            <a:tileRect/>
-          </a:gradFill>
-          <a:ln>
-            <a:noFill/>
-          </a:ln>
-        </p:spPr>
-        <p:style>
-          <a:lnRef idx="1">
-            <a:schemeClr val="accent1"/>
-          </a:lnRef>
-          <a:fillRef idx="3">
-            <a:schemeClr val="accent1"/>
-          </a:fillRef>
-          <a:effectRef idx="2">
-            <a:schemeClr val="accent1"/>
-          </a:effectRef>
-          <a:fontRef idx="minor">
-            <a:schemeClr val="lt1"/>
-          </a:fontRef>
-        </p:style>
-        <p:txBody>
-          <a:bodyPr rtlCol="0" anchor="ctr"/>
-          <a:lstStyle/>
-          <a:p>
-            <a:pPr algn="ctr"/>
-            <a:endParaRPr lang="en-US" sz="1700" dirty="0"/>
-          </a:p>
-        </p:txBody>
-      </p:sp>
-      <p:sp>
-        <p:nvSpPr>
           <p:cNvPr id="48" name="TextBox 47"/>
           <p:cNvSpPr txBox="1"/>
           <p:nvPr/>
@@ -10090,7 +9987,7 @@
             <a:ln w="25400" cap="flat" cmpd="sng" algn="ctr">
               <a:solidFill>
                 <a:schemeClr val="bg2">
-                  <a:lumMod val="90000"/>
+                  <a:lumMod val="50000"/>
                 </a:schemeClr>
               </a:solidFill>
               <a:prstDash val="dash"/>
@@ -10734,12 +10631,12 @@
       </p:par>
     </p:tnLst>
     <p:bldLst>
+      <p:bldP spid="45" grpId="0" animBg="1"/>
+      <p:bldP spid="45" grpId="1" animBg="1"/>
+      <p:bldP spid="45" grpId="2" animBg="1"/>
       <p:bldP spid="40" grpId="0"/>
       <p:bldP spid="41" grpId="0"/>
       <p:bldP spid="42" grpId="0"/>
-      <p:bldP spid="45" grpId="0" animBg="1"/>
-      <p:bldP spid="45" grpId="1" animBg="1"/>
-      <p:bldP spid="45" grpId="2" animBg="1"/>
       <p:bldP spid="48" grpId="0"/>
       <p:bldP spid="48" grpId="1"/>
     </p:bldLst>
@@ -11101,12 +10998,12 @@
         <p:spPr/>
         <p:txBody>
           <a:bodyPr>
-            <a:normAutofit fontScale="90000"/>
+            <a:normAutofit/>
           </a:bodyPr>
           <a:lstStyle/>
           <a:p>
             <a:r>
-              <a:rPr lang="en-US" dirty="0" smtClean="0">
+              <a:rPr lang="en-US" b="1" dirty="0" smtClean="0">
                 <a:solidFill>
                   <a:srgbClr val="000000"/>
                 </a:solidFill>
@@ -11114,10 +11011,10 @@
                 <a:ea typeface="MS Gothic" charset="0"/>
                 <a:cs typeface="MS Gothic" charset="0"/>
               </a:rPr>
-              <a:t>Active RDMA Architecture</a:t>
-            </a:r>
-            <a:br>
-              <a:rPr lang="en-US" dirty="0" smtClean="0">
+              <a:t>Active RDMA </a:t>
+            </a:r>
+            <a:r>
+              <a:rPr lang="en-US" b="1" dirty="0" smtClean="0">
                 <a:solidFill>
                   <a:srgbClr val="000000"/>
                 </a:solidFill>
@@ -11125,8 +11022,9 @@
                 <a:ea typeface="MS Gothic" charset="0"/>
                 <a:cs typeface="MS Gothic" charset="0"/>
               </a:rPr>
-            </a:br>
-            <a:endParaRPr lang="en-US" dirty="0"/>
+              <a:t>Architecture</a:t>
+            </a:r>
+            <a:endParaRPr lang="en-US" b="1" dirty="0"/>
           </a:p>
         </p:txBody>
       </p:sp>
@@ -11146,8 +11044,8 @@
           </a:prstGeom>
           <a:solidFill>
             <a:schemeClr val="accent4">
-              <a:lumMod val="20000"/>
-              <a:lumOff val="80000"/>
+              <a:lumMod val="60000"/>
+              <a:lumOff val="40000"/>
             </a:schemeClr>
           </a:solidFill>
         </p:spPr>
@@ -11190,8 +11088,8 @@
           </a:prstGeom>
           <a:solidFill>
             <a:schemeClr val="accent4">
-              <a:lumMod val="20000"/>
-              <a:lumOff val="80000"/>
+              <a:lumMod val="60000"/>
+              <a:lumOff val="40000"/>
             </a:schemeClr>
           </a:solidFill>
         </p:spPr>
@@ -11485,7 +11383,7 @@
         <p:spPr>
           <a:xfrm>
             <a:off x="4219520" y="2937329"/>
-            <a:ext cx="992918" cy="369332"/>
+            <a:ext cx="1172116" cy="369332"/>
           </a:xfrm>
           <a:prstGeom prst="rect">
             <a:avLst/>
@@ -11499,10 +11397,16 @@
           <a:lstStyle/>
           <a:p>
             <a:r>
-              <a:rPr lang="en-US" dirty="0" smtClean="0"/>
-              <a:t>network</a:t>
-            </a:r>
-            <a:endParaRPr lang="en-US" dirty="0"/>
+              <a:rPr lang="en-US" b="1" dirty="0" smtClean="0">
+                <a:latin typeface="Andale Mono"/>
+                <a:cs typeface="Andale Mono"/>
+              </a:rPr>
+              <a:t>NETWORK</a:t>
+            </a:r>
+            <a:endParaRPr lang="en-US" b="1" dirty="0">
+              <a:latin typeface="Andale Mono"/>
+              <a:cs typeface="Andale Mono"/>
+            </a:endParaRPr>
           </a:p>
         </p:txBody>
       </p:sp>
@@ -11543,28 +11447,6 @@
       </p:grpSpPr>
       <p:sp>
         <p:nvSpPr>
-          <p:cNvPr id="4" name="Date Placeholder 3"/>
-          <p:cNvSpPr>
-            <a:spLocks noGrp="1"/>
-          </p:cNvSpPr>
-          <p:nvPr>
-            <p:ph type="dt" idx="10"/>
-          </p:nvPr>
-        </p:nvSpPr>
-        <p:spPr/>
-        <p:txBody>
-          <a:bodyPr/>
-          <a:lstStyle/>
-          <a:p>
-            <a:r>
-              <a:rPr lang="en-US"/>
-              <a:t>5/4/10</a:t>
-            </a:r>
-          </a:p>
-        </p:txBody>
-      </p:sp>
-      <p:sp>
-        <p:nvSpPr>
           <p:cNvPr id="7169" name="Rectangle 1"/>
           <p:cNvSpPr>
             <a:spLocks noGrp="1" noChangeArrowheads="1"/>
@@ -11610,14 +11492,14 @@
               </a:tabLst>
             </a:pPr>
             <a:r>
-              <a:rPr lang="en-US" sz="4400" dirty="0"/>
+              <a:rPr lang="en-US" sz="4400" b="1" dirty="0"/>
               <a:t>Active RDMA -</a:t>
             </a:r>
             <a:r>
-              <a:rPr lang="en-US" sz="4400" dirty="0" smtClean="0"/>
+              <a:rPr lang="en-US" sz="4400" b="1" dirty="0" smtClean="0"/>
               <a:t> primitives</a:t>
             </a:r>
-            <a:endParaRPr lang="en-US" sz="4400" dirty="0"/>
+            <a:endParaRPr lang="en-US" sz="4400" b="1" dirty="0"/>
           </a:p>
         </p:txBody>
       </p:sp>
@@ -11664,7 +11546,7 @@
               <a:spcAft>
                 <a:spcPts val="1425"/>
               </a:spcAft>
-              <a:buSzPct val="45000"/>
+              <a:buSzPct val="100000"/>
               <a:buFont typeface="Arial"/>
               <a:buChar char="•"/>
               <a:tabLst>
@@ -11712,7 +11594,7 @@
               <a:spcAft>
                 <a:spcPts val="1425"/>
               </a:spcAft>
-              <a:buSzPct val="45000"/>
+              <a:buSzPct val="100000"/>
               <a:buFont typeface="Arial"/>
               <a:buChar char="•"/>
               <a:tabLst>
@@ -11752,9 +11634,9 @@
               <a:spcAft>
                 <a:spcPts val="1425"/>
               </a:spcAft>
-              <a:buSzPct val="45000"/>
-              <a:buFont typeface="Arial"/>
-              <a:buChar char="•"/>
+              <a:buSzPct val="100000"/>
+              <a:buFont typeface="Wingdings" charset="2"/>
+              <a:buChar char="§"/>
               <a:tabLst>
                 <a:tab pos="723900" algn="l"/>
                 <a:tab pos="1447800" algn="l"/>
@@ -11814,9 +11696,9 @@
               <a:spcAft>
                 <a:spcPts val="1425"/>
               </a:spcAft>
-              <a:buSzPct val="45000"/>
-              <a:buFont typeface="Arial"/>
-              <a:buChar char="•"/>
+              <a:buSzPct val="100000"/>
+              <a:buFont typeface="Wingdings" charset="2"/>
+              <a:buChar char="§"/>
               <a:tabLst>
                 <a:tab pos="723900" algn="l"/>
                 <a:tab pos="1447800" algn="l"/>
@@ -11876,9 +11758,9 @@
               <a:spcAft>
                 <a:spcPts val="1425"/>
               </a:spcAft>
-              <a:buSzPct val="45000"/>
-              <a:buFont typeface="Arial"/>
-              <a:buChar char="•"/>
+              <a:buSzPct val="100000"/>
+              <a:buFont typeface="Wingdings" charset="2"/>
+              <a:buChar char="§"/>
               <a:tabLst>
                 <a:tab pos="723900" algn="l"/>
                 <a:tab pos="1447800" algn="l"/>
@@ -11966,7 +11848,7 @@
                 <a:spcPts val="1425"/>
               </a:spcAft>
               <a:buClrTx/>
-              <a:buSzTx/>
+              <a:buSzPct val="100000"/>
               <a:buFont typeface="Arial"/>
               <a:buChar char="•"/>
               <a:tabLst>

</xml_diff>

<commit_message>
presentation tweaks from right before our talk
</commit_message>
<xml_diff>
--- a/doc/presentation/presentation.pptx
+++ b/doc/presentation/presentation.pptx
@@ -214,7 +214,7 @@
             <a:fld id="{4C6A7666-FF56-AD47-9C9E-3FCA90AD0E78}" type="datetimeFigureOut">
               <a:rPr lang="en-US" smtClean="0"/>
               <a:pPr/>
-              <a:t>5/4/10</a:t>
+              <a:t>5/5/10</a:t>
             </a:fld>
             <a:endParaRPr lang="en-US"/>
           </a:p>
@@ -1289,7 +1289,7 @@
             <a:fld id="{2A0580CB-E5BB-3C46-B648-7423DFC3B028}" type="datetimeFigureOut">
               <a:rPr lang="en-US" smtClean="0"/>
               <a:pPr/>
-              <a:t>5/4/10</a:t>
+              <a:t>5/5/10</a:t>
             </a:fld>
             <a:endParaRPr lang="en-US"/>
           </a:p>
@@ -1459,7 +1459,7 @@
             <a:fld id="{2A0580CB-E5BB-3C46-B648-7423DFC3B028}" type="datetimeFigureOut">
               <a:rPr lang="en-US" smtClean="0"/>
               <a:pPr/>
-              <a:t>5/4/10</a:t>
+              <a:t>5/5/10</a:t>
             </a:fld>
             <a:endParaRPr lang="en-US"/>
           </a:p>
@@ -1639,7 +1639,7 @@
             <a:fld id="{2A0580CB-E5BB-3C46-B648-7423DFC3B028}" type="datetimeFigureOut">
               <a:rPr lang="en-US" smtClean="0"/>
               <a:pPr/>
-              <a:t>5/4/10</a:t>
+              <a:t>5/5/10</a:t>
             </a:fld>
             <a:endParaRPr lang="en-US"/>
           </a:p>
@@ -1809,7 +1809,7 @@
             <a:fld id="{2A0580CB-E5BB-3C46-B648-7423DFC3B028}" type="datetimeFigureOut">
               <a:rPr lang="en-US" smtClean="0"/>
               <a:pPr/>
-              <a:t>5/4/10</a:t>
+              <a:t>5/5/10</a:t>
             </a:fld>
             <a:endParaRPr lang="en-US"/>
           </a:p>
@@ -2055,7 +2055,7 @@
             <a:fld id="{2A0580CB-E5BB-3C46-B648-7423DFC3B028}" type="datetimeFigureOut">
               <a:rPr lang="en-US" smtClean="0"/>
               <a:pPr/>
-              <a:t>5/4/10</a:t>
+              <a:t>5/5/10</a:t>
             </a:fld>
             <a:endParaRPr lang="en-US"/>
           </a:p>
@@ -2343,7 +2343,7 @@
             <a:fld id="{2A0580CB-E5BB-3C46-B648-7423DFC3B028}" type="datetimeFigureOut">
               <a:rPr lang="en-US" smtClean="0"/>
               <a:pPr/>
-              <a:t>5/4/10</a:t>
+              <a:t>5/5/10</a:t>
             </a:fld>
             <a:endParaRPr lang="en-US"/>
           </a:p>
@@ -2765,7 +2765,7 @@
             <a:fld id="{2A0580CB-E5BB-3C46-B648-7423DFC3B028}" type="datetimeFigureOut">
               <a:rPr lang="en-US" smtClean="0"/>
               <a:pPr/>
-              <a:t>5/4/10</a:t>
+              <a:t>5/5/10</a:t>
             </a:fld>
             <a:endParaRPr lang="en-US"/>
           </a:p>
@@ -2883,7 +2883,7 @@
             <a:fld id="{2A0580CB-E5BB-3C46-B648-7423DFC3B028}" type="datetimeFigureOut">
               <a:rPr lang="en-US" smtClean="0"/>
               <a:pPr/>
-              <a:t>5/4/10</a:t>
+              <a:t>5/5/10</a:t>
             </a:fld>
             <a:endParaRPr lang="en-US"/>
           </a:p>
@@ -2978,7 +2978,7 @@
             <a:fld id="{2A0580CB-E5BB-3C46-B648-7423DFC3B028}" type="datetimeFigureOut">
               <a:rPr lang="en-US" smtClean="0"/>
               <a:pPr/>
-              <a:t>5/4/10</a:t>
+              <a:t>5/5/10</a:t>
             </a:fld>
             <a:endParaRPr lang="en-US"/>
           </a:p>
@@ -3255,7 +3255,7 @@
             <a:fld id="{2A0580CB-E5BB-3C46-B648-7423DFC3B028}" type="datetimeFigureOut">
               <a:rPr lang="en-US" smtClean="0"/>
               <a:pPr/>
-              <a:t>5/4/10</a:t>
+              <a:t>5/5/10</a:t>
             </a:fld>
             <a:endParaRPr lang="en-US"/>
           </a:p>
@@ -3508,7 +3508,7 @@
             <a:fld id="{2A0580CB-E5BB-3C46-B648-7423DFC3B028}" type="datetimeFigureOut">
               <a:rPr lang="en-US" smtClean="0"/>
               <a:pPr/>
-              <a:t>5/4/10</a:t>
+              <a:t>5/5/10</a:t>
             </a:fld>
             <a:endParaRPr lang="en-US"/>
           </a:p>
@@ -3721,7 +3721,7 @@
             <a:fld id="{2A0580CB-E5BB-3C46-B648-7423DFC3B028}" type="datetimeFigureOut">
               <a:rPr lang="en-US" smtClean="0"/>
               <a:pPr/>
-              <a:t>5/4/10</a:t>
+              <a:t>5/5/10</a:t>
             </a:fld>
             <a:endParaRPr lang="en-US"/>
           </a:p>
@@ -4451,7 +4451,7 @@
         </p:spPr>
         <p:txBody>
           <a:bodyPr>
-            <a:normAutofit fontScale="90000"/>
+            <a:normAutofit/>
           </a:bodyPr>
           <a:lstStyle/>
           <a:p>
@@ -4736,17 +4736,7 @@
                 <a:ea typeface="MS Gothic" charset="0"/>
                 <a:cs typeface="MS Gothic" charset="0"/>
               </a:rPr>
-              <a:t>ARFS </a:t>
-            </a:r>
-            <a:r>
-              <a:rPr lang="en-US" dirty="0" smtClean="0">
-                <a:solidFill>
-                  <a:srgbClr val="000000"/>
-                </a:solidFill>
-                <a:ea typeface="MS Gothic" charset="0"/>
-                <a:cs typeface="MS Gothic" charset="0"/>
-              </a:rPr>
-              <a:t>Active Code</a:t>
+              <a:t>ARFS Active Code</a:t>
             </a:r>
             <a:endParaRPr lang="en-US" dirty="0">
               <a:solidFill>
@@ -5026,17 +5016,7 @@
                 <a:ea typeface="MS Gothic" charset="0"/>
                 <a:cs typeface="MS Gothic" charset="0"/>
               </a:rPr>
-              <a:t>ARFS </a:t>
-            </a:r>
-            <a:r>
-              <a:rPr lang="en-US" dirty="0" smtClean="0">
-                <a:solidFill>
-                  <a:srgbClr val="000000"/>
-                </a:solidFill>
-                <a:ea typeface="MS Gothic" charset="0"/>
-                <a:cs typeface="MS Gothic" charset="0"/>
-              </a:rPr>
-              <a:t>Client</a:t>
+              <a:t>ARFS Client</a:t>
             </a:r>
             <a:endParaRPr lang="en-US" dirty="0">
               <a:solidFill>
@@ -5878,18 +5858,7 @@
                 <a:ea typeface="MS Gothic" charset="0"/>
                 <a:cs typeface="MS Gothic" charset="0"/>
               </a:rPr>
-              <a:t> store : Address</a:t>
-            </a:r>
-            <a:r>
-              <a:rPr lang="en-US" sz="3200" dirty="0" smtClean="0">
-                <a:solidFill>
-                  <a:srgbClr val="000000"/>
-                </a:solidFill>
-                <a:latin typeface="Calibri" charset="0"/>
-                <a:ea typeface="MS Gothic" charset="0"/>
-                <a:cs typeface="MS Gothic" charset="0"/>
-              </a:rPr>
-              <a:t> </a:t>
+              <a:t> store : Address </a:t>
             </a:r>
             <a:r>
               <a:rPr lang="en-US" sz="3200" dirty="0" err="1" smtClean="0">
@@ -5913,19 +5882,7 @@
                 <a:cs typeface="MS Gothic" charset="0"/>
                 <a:sym typeface="Wingdings"/>
               </a:rPr>
-              <a:t> </a:t>
-            </a:r>
-            <a:r>
-              <a:rPr lang="en-US" sz="3200" dirty="0" smtClean="0">
-                <a:solidFill>
-                  <a:srgbClr val="000000"/>
-                </a:solidFill>
-                <a:latin typeface="Calibri" charset="0"/>
-                <a:ea typeface="MS Gothic" charset="0"/>
-                <a:cs typeface="MS Gothic" charset="0"/>
-                <a:sym typeface="Wingdings"/>
-              </a:rPr>
-              <a:t>Data blocks</a:t>
+              <a:t> Data blocks</a:t>
             </a:r>
             <a:endParaRPr lang="en-US" sz="3200" dirty="0" smtClean="0">
               <a:solidFill>
@@ -6032,18 +5989,7 @@
                 <a:ea typeface="MS Gothic" charset="0"/>
                 <a:cs typeface="MS Gothic" charset="0"/>
               </a:rPr>
-              <a:t> store</a:t>
-            </a:r>
-            <a:r>
-              <a:rPr lang="en-US" sz="3200" dirty="0" smtClean="0">
-                <a:solidFill>
-                  <a:srgbClr val="000000"/>
-                </a:solidFill>
-                <a:latin typeface="Calibri" charset="0"/>
-                <a:ea typeface="MS Gothic" charset="0"/>
-                <a:cs typeface="MS Gothic" charset="0"/>
-              </a:rPr>
-              <a:t> </a:t>
+              <a:t> store </a:t>
             </a:r>
           </a:p>
           <a:p>
@@ -6100,31 +6046,7 @@
                 <a:cs typeface="MS Gothic" charset="0"/>
                 <a:sym typeface="Wingdings"/>
               </a:rPr>
-              <a:t> </a:t>
-            </a:r>
-            <a:r>
-              <a:rPr lang="en-US" sz="3200" dirty="0" smtClean="0">
-                <a:solidFill>
-                  <a:srgbClr val="000000"/>
-                </a:solidFill>
-                <a:latin typeface="Calibri" charset="0"/>
-                <a:ea typeface="MS Gothic" charset="0"/>
-                <a:cs typeface="MS Gothic" charset="0"/>
-                <a:sym typeface="Wingdings"/>
-              </a:rPr>
-              <a:t>hierarchical data </a:t>
-            </a:r>
-            <a:r>
-              <a:rPr lang="en-US" sz="3200" dirty="0" smtClean="0">
-                <a:solidFill>
-                  <a:srgbClr val="000000"/>
-                </a:solidFill>
-                <a:latin typeface="Calibri" charset="0"/>
-                <a:ea typeface="MS Gothic" charset="0"/>
-                <a:cs typeface="MS Gothic" charset="0"/>
-                <a:sym typeface="Wingdings"/>
-              </a:rPr>
-              <a:t>store</a:t>
+              <a:t> hierarchical data store</a:t>
             </a:r>
             <a:endParaRPr lang="en-US" sz="3200" dirty="0">
               <a:solidFill>
@@ -6259,11 +6181,7 @@
           <a:p>
             <a:r>
               <a:rPr lang="en-US" dirty="0" smtClean="0"/>
-              <a:t>Tests:</a:t>
-            </a:r>
-            <a:r>
-              <a:rPr lang="en-US" dirty="0" smtClean="0"/>
-              <a:t> </a:t>
+              <a:t>Tests: </a:t>
             </a:r>
           </a:p>
           <a:p>
@@ -6277,26 +6195,14 @@
             <a:pPr lvl="1"/>
             <a:r>
               <a:rPr lang="en-US" dirty="0" smtClean="0"/>
-              <a:t>Stream</a:t>
-            </a:r>
+              <a:t>Stream-Read</a:t>
+            </a:r>
+          </a:p>
+          <a:p>
+            <a:pPr lvl="1"/>
             <a:r>
               <a:rPr lang="en-US" dirty="0" smtClean="0"/>
-              <a:t>-</a:t>
-            </a:r>
-            <a:r>
-              <a:rPr lang="en-US" dirty="0" smtClean="0"/>
-              <a:t>Read</a:t>
-            </a:r>
-          </a:p>
-          <a:p>
-            <a:pPr lvl="1"/>
-            <a:r>
-              <a:rPr lang="en-US" dirty="0" smtClean="0"/>
-              <a:t>Stream</a:t>
-            </a:r>
-            <a:r>
-              <a:rPr lang="en-US" dirty="0" smtClean="0"/>
-              <a:t>-Write</a:t>
+              <a:t>Stream-Write</a:t>
             </a:r>
           </a:p>
           <a:p>
@@ -6310,37 +6216,21 @@
             </a:r>
             <a:r>
               <a:rPr lang="en-US" dirty="0" smtClean="0"/>
-              <a:t>:</a:t>
-            </a:r>
+              <a:t>: </a:t>
+            </a:r>
+          </a:p>
+          <a:p>
+            <a:pPr lvl="1"/>
             <a:r>
               <a:rPr lang="en-US" dirty="0" smtClean="0"/>
-              <a:t> </a:t>
+              <a:t>system utilities </a:t>
             </a:r>
           </a:p>
           <a:p>
             <a:pPr lvl="1"/>
             <a:r>
               <a:rPr lang="en-US" dirty="0" smtClean="0"/>
-              <a:t>system </a:t>
-            </a:r>
-            <a:r>
-              <a:rPr lang="en-US" dirty="0" smtClean="0"/>
-              <a:t>utilities</a:t>
-            </a:r>
-            <a:r>
-              <a:rPr lang="en-US" dirty="0" smtClean="0"/>
-              <a:t> </a:t>
-            </a:r>
-          </a:p>
-          <a:p>
-            <a:pPr lvl="1"/>
-            <a:r>
-              <a:rPr lang="en-US" dirty="0" smtClean="0"/>
-              <a:t>active </a:t>
-            </a:r>
-            <a:r>
-              <a:rPr lang="en-US" dirty="0" smtClean="0"/>
-              <a:t>versions</a:t>
+              <a:t>active versions</a:t>
             </a:r>
           </a:p>
           <a:p>
@@ -6419,7 +6309,7 @@
         <p:spPr/>
         <p:txBody>
           <a:bodyPr>
-            <a:normAutofit fontScale="85000" lnSpcReduction="10000"/>
+            <a:normAutofit fontScale="92500"/>
           </a:bodyPr>
           <a:lstStyle/>
           <a:p>
@@ -7154,7 +7044,7 @@
         <p:spPr/>
         <p:txBody>
           <a:bodyPr>
-            <a:normAutofit fontScale="92500" lnSpcReduction="10000"/>
+            <a:normAutofit fontScale="92500"/>
           </a:bodyPr>
           <a:lstStyle/>
           <a:p>
@@ -7162,12 +7052,45 @@
               <a:rPr lang="en-US" dirty="0" smtClean="0"/>
               <a:t>Better methodology</a:t>
             </a:r>
+            <a:endParaRPr lang="en-US" dirty="0" smtClean="0"/>
           </a:p>
           <a:p>
             <a:pPr lvl="1"/>
             <a:r>
               <a:rPr lang="en-US" dirty="0" smtClean="0"/>
-              <a:t>Good: Extend virtual time to clients and network, build cycle-accurate model of active code coprocessor (real ISA, cache coherence with main CPU, …)</a:t>
+              <a:t>Acceptable </a:t>
+            </a:r>
+            <a:r>
+              <a:rPr lang="en-US" dirty="0" smtClean="0"/>
+              <a:t>but </a:t>
+            </a:r>
+            <a:r>
+              <a:rPr lang="en-US" dirty="0" smtClean="0"/>
+              <a:t>tractable: pace JVM appropriately, model network delay, run client in separate </a:t>
+            </a:r>
+            <a:r>
+              <a:rPr lang="en-US" dirty="0" err="1" smtClean="0"/>
+              <a:t>Bochs</a:t>
+            </a:r>
+            <a:endParaRPr lang="en-US" dirty="0" smtClean="0"/>
+          </a:p>
+          <a:p>
+            <a:pPr lvl="1"/>
+            <a:r>
+              <a:rPr lang="en-US" dirty="0" smtClean="0"/>
+              <a:t>Better: </a:t>
+            </a:r>
+            <a:r>
+              <a:rPr lang="en-US" dirty="0" smtClean="0"/>
+              <a:t>Extend</a:t>
+            </a:r>
+            <a:r>
+              <a:rPr lang="en-US" dirty="0" smtClean="0"/>
+              <a:t> cycle-accurate simulated domain </a:t>
+            </a:r>
+            <a:r>
+              <a:rPr lang="en-US" dirty="0" smtClean="0"/>
+              <a:t>to clients and network, build cycle-accurate model of active code coprocessor (real ISA, cache coherence with main CPU, …)</a:t>
             </a:r>
           </a:p>
           <a:p>
@@ -7189,7 +7112,11 @@
             </a:r>
             <a:r>
               <a:rPr lang="en-US" dirty="0" smtClean="0"/>
-              <a:t>) in server kernel or (ii) on real NIC</a:t>
+              <a:t>) in server kernel or (ii) on real </a:t>
+            </a:r>
+            <a:r>
+              <a:rPr lang="en-US" dirty="0" smtClean="0"/>
+              <a:t>NIC (FPGA?)</a:t>
             </a:r>
           </a:p>
           <a:p>
@@ -7201,18 +7128,6 @@
             <a:r>
               <a:rPr lang="en-US" dirty="0" err="1" smtClean="0"/>
               <a:t>filesystem</a:t>
-            </a:r>
-            <a:endParaRPr lang="en-US" dirty="0" smtClean="0"/>
-          </a:p>
-          <a:p>
-            <a:pPr lvl="1"/>
-            <a:r>
-              <a:rPr lang="en-US" dirty="0" smtClean="0"/>
-              <a:t>Acceptable but more tractable: pace JVM appropriately, model network delay, run client in separate </a:t>
-            </a:r>
-            <a:r>
-              <a:rPr lang="en-US" dirty="0" err="1" smtClean="0"/>
-              <a:t>Bochs</a:t>
             </a:r>
             <a:endParaRPr lang="en-US" dirty="0" smtClean="0"/>
           </a:p>
@@ -7289,7 +7204,7 @@
         <p:spPr/>
         <p:txBody>
           <a:bodyPr>
-            <a:normAutofit fontScale="92500"/>
+            <a:normAutofit lnSpcReduction="10000"/>
           </a:bodyPr>
           <a:lstStyle/>
           <a:p>
@@ -11011,18 +10926,7 @@
                 <a:ea typeface="MS Gothic" charset="0"/>
                 <a:cs typeface="MS Gothic" charset="0"/>
               </a:rPr>
-              <a:t>Active RDMA </a:t>
-            </a:r>
-            <a:r>
-              <a:rPr lang="en-US" b="1" dirty="0" smtClean="0">
-                <a:solidFill>
-                  <a:srgbClr val="000000"/>
-                </a:solidFill>
-                <a:latin typeface="Calibri" charset="0"/>
-                <a:ea typeface="MS Gothic" charset="0"/>
-                <a:cs typeface="MS Gothic" charset="0"/>
-              </a:rPr>
-              <a:t>Architecture</a:t>
+              <a:t>Active RDMA Architecture</a:t>
             </a:r>
             <a:endParaRPr lang="en-US" b="1" dirty="0"/>
           </a:p>
@@ -11622,14 +11526,6 @@
               </a:rPr>
               <a:t>Our extensions:</a:t>
             </a:r>
-            <a:endParaRPr lang="en-US" sz="2400" dirty="0" smtClean="0">
-              <a:solidFill>
-                <a:srgbClr val="000000"/>
-              </a:solidFill>
-              <a:latin typeface="Calibri" charset="0"/>
-              <a:ea typeface="MS Gothic" charset="0"/>
-              <a:cs typeface="MS Gothic" charset="0"/>
-            </a:endParaRPr>
           </a:p>
           <a:p>
             <a:pPr marL="798513" lvl="1" indent="-339725">
@@ -11668,18 +11564,7 @@
                 <a:ea typeface="MS Gothic" charset="0"/>
                 <a:cs typeface="MS Gothic" charset="0"/>
               </a:rPr>
-              <a:t>Load </a:t>
-            </a:r>
-            <a:r>
-              <a:rPr lang="en-US" sz="2400" dirty="0" smtClean="0">
-                <a:solidFill>
-                  <a:srgbClr val="000000"/>
-                </a:solidFill>
-                <a:latin typeface="Calibri" charset="0"/>
-                <a:ea typeface="MS Gothic" charset="0"/>
-                <a:cs typeface="MS Gothic" charset="0"/>
-              </a:rPr>
-              <a:t>( </a:t>
+              <a:t>Load ( </a:t>
             </a:r>
             <a:r>
               <a:rPr lang="en-US" sz="2400" dirty="0" err="1" smtClean="0">

</xml_diff>